<commit_message>
added changes for next sprint section
</commit_message>
<xml_diff>
--- a/documents/Sprint 1 Report.pptx
+++ b/documents/Sprint 1 Report.pptx
@@ -8,6 +8,7 @@
     <p:sldId id="256" r:id="rId2"/>
     <p:sldId id="257" r:id="rId3"/>
     <p:sldId id="258" r:id="rId4"/>
+    <p:sldId id="259" r:id="rId5"/>
   </p:sldIdLst>
   <p:sldSz cx="12192000" cy="6858000"/>
   <p:notesSz cx="6858000" cy="9144000"/>
@@ -106,6 +107,11 @@
       </a:defRPr>
     </a:lvl9pPr>
   </p:defaultTextStyle>
+  <p:extLst>
+    <p:ext uri="{EFAFB233-063F-42B5-8137-9DF3F51BA10A}">
+      <p15:sldGuideLst xmlns:p15="http://schemas.microsoft.com/office/powerpoint/2012/main"/>
+    </p:ext>
+  </p:extLst>
 </p:presentation>
 </file>
 
@@ -10696,13 +10702,8 @@
           <a:p>
             <a:r>
               <a:rPr lang="en-US" dirty="0"/>
-              <a:t>Feature 1: Login, and Feature 2: Register have both been Completed and Feature 1 sends to </a:t>
+              <a:t>Feature 1: Login, and Feature 2: Register have both been Completed and Feature 1 sends to correct dashboard.</a:t>
             </a:r>
-            <a:r>
-              <a:rPr lang="en-US"/>
-              <a:t>correct dashboard.</a:t>
-            </a:r>
-            <a:endParaRPr lang="en-US" dirty="0"/>
           </a:p>
           <a:p>
             <a:r>
@@ -10881,6 +10882,133 @@
     <p:extLst>
       <p:ext uri="{BB962C8B-B14F-4D97-AF65-F5344CB8AC3E}">
         <p14:creationId xmlns:p14="http://schemas.microsoft.com/office/powerpoint/2010/main" val="1117049143"/>
+      </p:ext>
+    </p:extLst>
+  </p:cSld>
+  <p:clrMapOvr>
+    <a:masterClrMapping/>
+  </p:clrMapOvr>
+</p:sld>
+</file>
+
+<file path=ppt/slides/slide4.xml><?xml version="1.0" encoding="utf-8"?>
+<p:sld xmlns:a="http://schemas.openxmlformats.org/drawingml/2006/main" xmlns:r="http://schemas.openxmlformats.org/officeDocument/2006/relationships" xmlns:p="http://schemas.openxmlformats.org/presentationml/2006/main">
+  <p:cSld>
+    <p:spTree>
+      <p:nvGrpSpPr>
+        <p:cNvPr id="1" name=""/>
+        <p:cNvGrpSpPr/>
+        <p:nvPr/>
+      </p:nvGrpSpPr>
+      <p:grpSpPr>
+        <a:xfrm>
+          <a:off x="0" y="0"/>
+          <a:ext cx="0" cy="0"/>
+          <a:chOff x="0" y="0"/>
+          <a:chExt cx="0" cy="0"/>
+        </a:xfrm>
+      </p:grpSpPr>
+      <p:sp>
+        <p:nvSpPr>
+          <p:cNvPr id="2" name="Title 1">
+            <a:extLst>
+              <a:ext uri="{FF2B5EF4-FFF2-40B4-BE49-F238E27FC236}">
+                <a16:creationId xmlns:a16="http://schemas.microsoft.com/office/drawing/2014/main" id="{49D3E0C9-9176-4643-9DA3-F1F0F325080A}"/>
+              </a:ext>
+            </a:extLst>
+          </p:cNvPr>
+          <p:cNvSpPr>
+            <a:spLocks noGrp="1"/>
+          </p:cNvSpPr>
+          <p:nvPr>
+            <p:ph type="title"/>
+          </p:nvPr>
+        </p:nvSpPr>
+        <p:spPr/>
+        <p:txBody>
+          <a:bodyPr/>
+          <a:lstStyle/>
+          <a:p>
+            <a:r>
+              <a:rPr lang="en-US" dirty="0"/>
+              <a:t>Changes For Next Sprint</a:t>
+            </a:r>
+            <a:endParaRPr lang="en-GB" dirty="0"/>
+          </a:p>
+        </p:txBody>
+      </p:sp>
+      <p:sp>
+        <p:nvSpPr>
+          <p:cNvPr id="3" name="Content Placeholder 2">
+            <a:extLst>
+              <a:ext uri="{FF2B5EF4-FFF2-40B4-BE49-F238E27FC236}">
+                <a16:creationId xmlns:a16="http://schemas.microsoft.com/office/drawing/2014/main" id="{AAA7B36F-65D4-4B28-82B4-DA6756F96AF3}"/>
+              </a:ext>
+            </a:extLst>
+          </p:cNvPr>
+          <p:cNvSpPr>
+            <a:spLocks noGrp="1"/>
+          </p:cNvSpPr>
+          <p:nvPr>
+            <p:ph idx="1"/>
+          </p:nvPr>
+        </p:nvSpPr>
+        <p:spPr/>
+        <p:txBody>
+          <a:bodyPr>
+            <a:normAutofit/>
+          </a:bodyPr>
+          <a:lstStyle/>
+          <a:p>
+            <a:r>
+              <a:rPr lang="en-US" sz="1600" dirty="0"/>
+              <a:t>After initial stumbling over roles within the group, some merge conflicts, having a consistent communication over ownership of tasks through the google sheets trackers has been agreed upon for the coming sprint.</a:t>
+            </a:r>
+          </a:p>
+          <a:p>
+            <a:r>
+              <a:rPr lang="en-US" sz="1600" dirty="0"/>
+              <a:t>Multiple meetings of all 5 group members were ineffective when compared to small meetings between people  working on related tasks, and one meeting per week for all 5. This means that we shall be progressing calling meetings with required members, rather than all 5.</a:t>
+            </a:r>
+          </a:p>
+          <a:p>
+            <a:r>
+              <a:rPr lang="en-US" sz="1600" dirty="0"/>
+              <a:t>More Consistent Raising of Issues on the GitHub, rather than just calling on discord so that all members are aware of anything that’s not working.</a:t>
+            </a:r>
+          </a:p>
+          <a:p>
+            <a:r>
+              <a:rPr lang="en-US" sz="1600" dirty="0"/>
+              <a:t>Creating the sprint materials required to continue the project will be done on the first 2 days of the sprint rather than the week, as it makes the timeline too strict for work otherwise.</a:t>
+            </a:r>
+          </a:p>
+          <a:p>
+            <a:r>
+              <a:rPr lang="en-US" sz="1600" dirty="0"/>
+              <a:t>Meetings shall take place past the time of 12pm, and not in lunch breaks as to make sure that everyone is effective within such meetings.</a:t>
+            </a:r>
+          </a:p>
+          <a:p>
+            <a:r>
+              <a:rPr lang="en-US" sz="1600" dirty="0"/>
+              <a:t>Commits will be small and frequent, alongside occurring within branches unless urgent to add </a:t>
+            </a:r>
+            <a:r>
+              <a:rPr lang="en-US" sz="1600"/>
+              <a:t>to main.</a:t>
+            </a:r>
+            <a:endParaRPr lang="en-US" sz="1600" dirty="0"/>
+          </a:p>
+          <a:p>
+            <a:endParaRPr lang="en-GB" sz="1600" dirty="0"/>
+          </a:p>
+        </p:txBody>
+      </p:sp>
+    </p:spTree>
+    <p:extLst>
+      <p:ext uri="{BB962C8B-B14F-4D97-AF65-F5344CB8AC3E}">
+        <p14:creationId xmlns:p14="http://schemas.microsoft.com/office/powerpoint/2010/main" val="3536824388"/>
       </p:ext>
     </p:extLst>
   </p:cSld>

</xml_diff>